<commit_message>
changed: presentation with minor adjustments
</commit_message>
<xml_diff>
--- a/esercitazione_6/documents/Esercitazione 6.pptx
+++ b/esercitazione_6/documents/Esercitazione 6.pptx
@@ -27,19 +27,22 @@
     <p:embeddedFont>
       <p:font typeface="Open Sans" panose="020B0606030504020204" pitchFamily="34" charset="0"/>
       <p:regular r:id="rId14"/>
+      <p:bold r:id="rId15"/>
+      <p:italic r:id="rId16"/>
+      <p:boldItalic r:id="rId17"/>
     </p:embeddedFont>
     <p:embeddedFont>
       <p:font typeface="Open Sans Extra Bold" panose="020B0604020202020204" charset="0"/>
-      <p:regular r:id="rId15"/>
+      <p:regular r:id="rId18"/>
     </p:embeddedFont>
     <p:embeddedFont>
       <p:font typeface="Open Sans Light" panose="020B0306030504020204" pitchFamily="34" charset="0"/>
-      <p:regular r:id="rId16"/>
-      <p:italic r:id="rId17"/>
+      <p:regular r:id="rId19"/>
+      <p:italic r:id="rId20"/>
     </p:embeddedFont>
     <p:embeddedFont>
       <p:font typeface="Open Sans Light Bold" panose="020B0604020202020204" charset="0"/>
-      <p:regular r:id="rId18"/>
+      <p:regular r:id="rId21"/>
     </p:embeddedFont>
   </p:embeddedFontLst>
   <p:defaultTextStyle>
@@ -336,7 +339,7 @@
             <a:fld id="{1D8BD707-D9CF-40AE-B4C6-C98DA3205C09}" type="datetimeFigureOut">
               <a:rPr lang="en-US" smtClean="0"/>
               <a:pPr/>
-              <a:t>11/22/2021</a:t>
+              <a:t>11/23/2021</a:t>
             </a:fld>
             <a:endParaRPr lang="en-US"/>
           </a:p>
@@ -501,7 +504,7 @@
             <a:fld id="{1D8BD707-D9CF-40AE-B4C6-C98DA3205C09}" type="datetimeFigureOut">
               <a:rPr lang="en-US" smtClean="0"/>
               <a:pPr/>
-              <a:t>11/22/2021</a:t>
+              <a:t>11/23/2021</a:t>
             </a:fld>
             <a:endParaRPr lang="en-US"/>
           </a:p>
@@ -676,7 +679,7 @@
             <a:fld id="{1D8BD707-D9CF-40AE-B4C6-C98DA3205C09}" type="datetimeFigureOut">
               <a:rPr lang="en-US" smtClean="0"/>
               <a:pPr/>
-              <a:t>11/22/2021</a:t>
+              <a:t>11/23/2021</a:t>
             </a:fld>
             <a:endParaRPr lang="en-US"/>
           </a:p>
@@ -841,7 +844,7 @@
             <a:fld id="{1D8BD707-D9CF-40AE-B4C6-C98DA3205C09}" type="datetimeFigureOut">
               <a:rPr lang="en-US" smtClean="0"/>
               <a:pPr/>
-              <a:t>11/22/2021</a:t>
+              <a:t>11/23/2021</a:t>
             </a:fld>
             <a:endParaRPr lang="en-US"/>
           </a:p>
@@ -1083,7 +1086,7 @@
             <a:fld id="{1D8BD707-D9CF-40AE-B4C6-C98DA3205C09}" type="datetimeFigureOut">
               <a:rPr lang="en-US" smtClean="0"/>
               <a:pPr/>
-              <a:t>11/22/2021</a:t>
+              <a:t>11/23/2021</a:t>
             </a:fld>
             <a:endParaRPr lang="en-US"/>
           </a:p>
@@ -1365,7 +1368,7 @@
             <a:fld id="{1D8BD707-D9CF-40AE-B4C6-C98DA3205C09}" type="datetimeFigureOut">
               <a:rPr lang="en-US" smtClean="0"/>
               <a:pPr/>
-              <a:t>11/22/2021</a:t>
+              <a:t>11/23/2021</a:t>
             </a:fld>
             <a:endParaRPr lang="en-US"/>
           </a:p>
@@ -1781,7 +1784,7 @@
             <a:fld id="{1D8BD707-D9CF-40AE-B4C6-C98DA3205C09}" type="datetimeFigureOut">
               <a:rPr lang="en-US" smtClean="0"/>
               <a:pPr/>
-              <a:t>11/22/2021</a:t>
+              <a:t>11/23/2021</a:t>
             </a:fld>
             <a:endParaRPr lang="en-US"/>
           </a:p>
@@ -1895,7 +1898,7 @@
             <a:fld id="{1D8BD707-D9CF-40AE-B4C6-C98DA3205C09}" type="datetimeFigureOut">
               <a:rPr lang="en-US" smtClean="0"/>
               <a:pPr/>
-              <a:t>11/22/2021</a:t>
+              <a:t>11/23/2021</a:t>
             </a:fld>
             <a:endParaRPr lang="en-US"/>
           </a:p>
@@ -1987,7 +1990,7 @@
             <a:fld id="{1D8BD707-D9CF-40AE-B4C6-C98DA3205C09}" type="datetimeFigureOut">
               <a:rPr lang="en-US" smtClean="0"/>
               <a:pPr/>
-              <a:t>11/22/2021</a:t>
+              <a:t>11/23/2021</a:t>
             </a:fld>
             <a:endParaRPr lang="en-US"/>
           </a:p>
@@ -2259,7 +2262,7 @@
             <a:fld id="{1D8BD707-D9CF-40AE-B4C6-C98DA3205C09}" type="datetimeFigureOut">
               <a:rPr lang="en-US" smtClean="0"/>
               <a:pPr/>
-              <a:t>11/22/2021</a:t>
+              <a:t>11/23/2021</a:t>
             </a:fld>
             <a:endParaRPr lang="en-US"/>
           </a:p>
@@ -2508,7 +2511,7 @@
             <a:fld id="{1D8BD707-D9CF-40AE-B4C6-C98DA3205C09}" type="datetimeFigureOut">
               <a:rPr lang="en-US" smtClean="0"/>
               <a:pPr/>
-              <a:t>11/22/2021</a:t>
+              <a:t>11/23/2021</a:t>
             </a:fld>
             <a:endParaRPr lang="en-US"/>
           </a:p>
@@ -2716,7 +2719,7 @@
             <a:fld id="{1D8BD707-D9CF-40AE-B4C6-C98DA3205C09}" type="datetimeFigureOut">
               <a:rPr lang="en-US" smtClean="0"/>
               <a:pPr/>
-              <a:t>11/22/2021</a:t>
+              <a:t>11/23/2021</a:t>
             </a:fld>
             <a:endParaRPr lang="en-US"/>
           </a:p>
@@ -4736,14 +4739,14 @@
         <p:spPr>
           <a:xfrm>
             <a:off x="383721" y="1884589"/>
-            <a:ext cx="2120057" cy="877570"/>
+            <a:ext cx="2511879" cy="877570"/>
           </a:xfrm>
           <a:prstGeom prst="rect">
             <a:avLst/>
           </a:prstGeom>
         </p:spPr>
         <p:txBody>
-          <a:bodyPr lIns="0" tIns="0" rIns="0" bIns="0" rtlCol="0" anchor="t">
+          <a:bodyPr wrap="square" lIns="0" tIns="0" rIns="0" bIns="0" rtlCol="0" anchor="t">
             <a:spAutoFit/>
           </a:bodyPr>
           <a:lstStyle/>
@@ -4754,7 +4757,7 @@
               </a:lnSpc>
             </a:pPr>
             <a:r>
-              <a:rPr lang="en-US" sz="5199">
+              <a:rPr lang="en-US" sz="5199" dirty="0" err="1">
                 <a:solidFill>
                   <a:srgbClr val="000000"/>
                 </a:solidFill>
@@ -4762,6 +4765,12 @@
               </a:rPr>
               <a:t>Cliente</a:t>
             </a:r>
+            <a:endParaRPr lang="en-US" sz="5199" dirty="0">
+              <a:solidFill>
+                <a:srgbClr val="000000"/>
+              </a:solidFill>
+              <a:latin typeface="Open Sans"/>
+            </a:endParaRPr>
           </a:p>
         </p:txBody>
       </p:sp>
@@ -4773,7 +4782,7 @@
         </p:nvSpPr>
         <p:spPr>
           <a:xfrm>
-            <a:off x="9144000" y="1884589"/>
+            <a:off x="9128949" y="558800"/>
             <a:ext cx="2759273" cy="877570"/>
           </a:xfrm>
           <a:prstGeom prst="rect">
@@ -4792,7 +4801,7 @@
               </a:lnSpc>
             </a:pPr>
             <a:r>
-              <a:rPr lang="en-US" sz="5199">
+              <a:rPr lang="en-US" sz="5199" dirty="0" err="1">
                 <a:solidFill>
                   <a:srgbClr val="FFFFFF"/>
                 </a:solidFill>
@@ -4800,6 +4809,12 @@
               </a:rPr>
               <a:t>Servitore</a:t>
             </a:r>
+            <a:endParaRPr lang="en-US" sz="5199" dirty="0">
+              <a:solidFill>
+                <a:srgbClr val="FFFFFF"/>
+              </a:solidFill>
+              <a:latin typeface="Open Sans"/>
+            </a:endParaRPr>
           </a:p>
         </p:txBody>
       </p:sp>
@@ -4811,7 +4826,7 @@
         </p:nvSpPr>
         <p:spPr>
           <a:xfrm>
-            <a:off x="10523637" y="7402225"/>
+            <a:off x="10508586" y="8604205"/>
             <a:ext cx="6387405" cy="949089"/>
           </a:xfrm>
           <a:prstGeom prst="rect">
@@ -4865,7 +4880,7 @@
         </p:nvGrpSpPr>
         <p:grpSpPr>
           <a:xfrm>
-            <a:off x="383721" y="3213424"/>
+            <a:off x="395375" y="2969434"/>
             <a:ext cx="1289957" cy="1289957"/>
             <a:chOff x="0" y="0"/>
             <a:chExt cx="1719943" cy="1719943"/>
@@ -4987,7 +5002,7 @@
         </p:nvSpPr>
         <p:spPr>
           <a:xfrm>
-            <a:off x="1950797" y="3360046"/>
+            <a:off x="1962451" y="3116056"/>
             <a:ext cx="6153852" cy="949089"/>
           </a:xfrm>
           <a:prstGeom prst="rect">
@@ -5009,13 +5024,76 @@
               </a:spcBef>
             </a:pPr>
             <a:r>
-              <a:rPr lang="en-US" sz="2759">
+              <a:rPr lang="en-US" sz="2759" dirty="0" err="1">
                 <a:solidFill>
                   <a:srgbClr val="000000"/>
                 </a:solidFill>
                 <a:latin typeface="Open Sans Light"/>
               </a:rPr>
-              <a:t>Recupero riferimento oggetto remoto da RMI Registry</a:t>
+              <a:t>Recupero</a:t>
+            </a:r>
+            <a:r>
+              <a:rPr lang="en-US" sz="2759" dirty="0">
+                <a:solidFill>
+                  <a:srgbClr val="000000"/>
+                </a:solidFill>
+                <a:latin typeface="Open Sans Light"/>
+              </a:rPr>
+              <a:t> </a:t>
+            </a:r>
+            <a:r>
+              <a:rPr lang="en-US" sz="2759" dirty="0" err="1">
+                <a:solidFill>
+                  <a:srgbClr val="000000"/>
+                </a:solidFill>
+                <a:latin typeface="Open Sans Light"/>
+              </a:rPr>
+              <a:t>riferimento</a:t>
+            </a:r>
+            <a:r>
+              <a:rPr lang="en-US" sz="2759" dirty="0">
+                <a:solidFill>
+                  <a:srgbClr val="000000"/>
+                </a:solidFill>
+                <a:latin typeface="Open Sans Light"/>
+              </a:rPr>
+              <a:t> </a:t>
+            </a:r>
+            <a:r>
+              <a:rPr lang="en-US" sz="2759" dirty="0" err="1">
+                <a:solidFill>
+                  <a:srgbClr val="000000"/>
+                </a:solidFill>
+                <a:latin typeface="Open Sans Light"/>
+              </a:rPr>
+              <a:t>oggetto</a:t>
+            </a:r>
+            <a:r>
+              <a:rPr lang="en-US" sz="2759" dirty="0">
+                <a:solidFill>
+                  <a:srgbClr val="000000"/>
+                </a:solidFill>
+                <a:latin typeface="Open Sans Light"/>
+              </a:rPr>
+              <a:t> </a:t>
+            </a:r>
+            <a:r>
+              <a:rPr lang="en-US" sz="2759" dirty="0" err="1">
+                <a:solidFill>
+                  <a:srgbClr val="000000"/>
+                </a:solidFill>
+                <a:latin typeface="Open Sans Light"/>
+              </a:rPr>
+              <a:t>remoto</a:t>
+            </a:r>
+            <a:r>
+              <a:rPr lang="en-US" sz="2759" dirty="0">
+                <a:solidFill>
+                  <a:srgbClr val="000000"/>
+                </a:solidFill>
+                <a:latin typeface="Open Sans Light"/>
+              </a:rPr>
+              <a:t> da RMI Registry</a:t>
             </a:r>
           </a:p>
         </p:txBody>
@@ -5028,7 +5106,7 @@
         </p:nvGrpSpPr>
         <p:grpSpPr>
           <a:xfrm>
-            <a:off x="383721" y="5143500"/>
+            <a:off x="388015" y="6402781"/>
             <a:ext cx="1289957" cy="1289957"/>
             <a:chOff x="0" y="0"/>
             <a:chExt cx="1719943" cy="1719943"/>
@@ -5130,7 +5208,7 @@
                 </a:lnSpc>
               </a:pPr>
               <a:r>
-                <a:rPr lang="en-US" sz="3399">
+                <a:rPr lang="en-US" sz="3399" dirty="0">
                   <a:solidFill>
                     <a:srgbClr val="FFFFFF"/>
                   </a:solidFill>
@@ -5150,7 +5228,7 @@
         </p:nvGrpSpPr>
         <p:grpSpPr>
           <a:xfrm>
-            <a:off x="383721" y="7255604"/>
+            <a:off x="388015" y="8514885"/>
             <a:ext cx="1289957" cy="1289957"/>
             <a:chOff x="0" y="0"/>
             <a:chExt cx="1719943" cy="1719943"/>
@@ -5252,7 +5330,7 @@
                 </a:lnSpc>
               </a:pPr>
               <a:r>
-                <a:rPr lang="en-US" sz="3399">
+                <a:rPr lang="en-US" sz="3399" dirty="0">
                   <a:solidFill>
                     <a:srgbClr val="FFFFFF"/>
                   </a:solidFill>
@@ -5272,7 +5350,7 @@
         </p:nvGrpSpPr>
         <p:grpSpPr>
           <a:xfrm>
-            <a:off x="8992365" y="3213424"/>
+            <a:off x="8980192" y="2020345"/>
             <a:ext cx="1289957" cy="1289957"/>
             <a:chOff x="0" y="0"/>
             <a:chExt cx="1719943" cy="1719943"/>
@@ -5374,7 +5452,7 @@
                 </a:lnSpc>
               </a:pPr>
               <a:r>
-                <a:rPr lang="en-US" sz="3399">
+                <a:rPr lang="en-US" sz="3399" dirty="0">
                   <a:solidFill>
                     <a:srgbClr val="FFFFFF"/>
                   </a:solidFill>
@@ -5394,7 +5472,7 @@
         </p:nvGrpSpPr>
         <p:grpSpPr>
           <a:xfrm>
-            <a:off x="8992365" y="5143500"/>
+            <a:off x="8977314" y="6345480"/>
             <a:ext cx="1289957" cy="1289957"/>
             <a:chOff x="0" y="0"/>
             <a:chExt cx="1719943" cy="1719943"/>
@@ -5496,7 +5574,7 @@
                 </a:lnSpc>
               </a:pPr>
               <a:r>
-                <a:rPr lang="en-US" sz="3399">
+                <a:rPr lang="en-US" sz="3399" dirty="0">
                   <a:solidFill>
                     <a:srgbClr val="FFFFFF"/>
                   </a:solidFill>
@@ -5516,7 +5594,7 @@
         </p:nvGrpSpPr>
         <p:grpSpPr>
           <a:xfrm>
-            <a:off x="8992365" y="7255604"/>
+            <a:off x="8977314" y="8457584"/>
             <a:ext cx="1289957" cy="1289957"/>
             <a:chOff x="0" y="0"/>
             <a:chExt cx="1719943" cy="1719943"/>
@@ -5638,7 +5716,7 @@
         </p:nvSpPr>
         <p:spPr>
           <a:xfrm>
-            <a:off x="10492255" y="3360046"/>
+            <a:off x="10480082" y="2166967"/>
             <a:ext cx="7446466" cy="949089"/>
           </a:xfrm>
           <a:prstGeom prst="rect">
@@ -5660,14 +5738,128 @@
               </a:spcBef>
             </a:pPr>
             <a:r>
-              <a:rPr lang="en-US" sz="2759">
+              <a:rPr lang="en-US" sz="2759" dirty="0" err="1">
                 <a:solidFill>
                   <a:srgbClr val="FFFFFF"/>
                 </a:solidFill>
                 <a:latin typeface="Open Sans Light"/>
               </a:rPr>
-              <a:t>Registrare il riferimento remoto sul registry alla locazione corretta</a:t>
-            </a:r>
+              <a:t>Registrare</a:t>
+            </a:r>
+            <a:r>
+              <a:rPr lang="en-US" sz="2759" dirty="0">
+                <a:solidFill>
+                  <a:srgbClr val="FFFFFF"/>
+                </a:solidFill>
+                <a:latin typeface="Open Sans Light"/>
+              </a:rPr>
+              <a:t> il </a:t>
+            </a:r>
+            <a:r>
+              <a:rPr lang="en-US" sz="2759" dirty="0" err="1">
+                <a:solidFill>
+                  <a:srgbClr val="FFFFFF"/>
+                </a:solidFill>
+                <a:latin typeface="Open Sans Light"/>
+              </a:rPr>
+              <a:t>riferimento</a:t>
+            </a:r>
+            <a:r>
+              <a:rPr lang="en-US" sz="2759" dirty="0">
+                <a:solidFill>
+                  <a:srgbClr val="FFFFFF"/>
+                </a:solidFill>
+                <a:latin typeface="Open Sans Light"/>
+              </a:rPr>
+              <a:t> </a:t>
+            </a:r>
+            <a:r>
+              <a:rPr lang="en-US" sz="2759" dirty="0" err="1">
+                <a:solidFill>
+                  <a:srgbClr val="FFFFFF"/>
+                </a:solidFill>
+                <a:latin typeface="Open Sans Light"/>
+              </a:rPr>
+              <a:t>remoto</a:t>
+            </a:r>
+            <a:r>
+              <a:rPr lang="en-US" sz="2759" dirty="0">
+                <a:solidFill>
+                  <a:srgbClr val="FFFFFF"/>
+                </a:solidFill>
+                <a:latin typeface="Open Sans Light"/>
+              </a:rPr>
+              <a:t> </a:t>
+            </a:r>
+            <a:r>
+              <a:rPr lang="en-US" sz="2759" dirty="0" err="1">
+                <a:solidFill>
+                  <a:srgbClr val="FFFFFF"/>
+                </a:solidFill>
+                <a:latin typeface="Open Sans Light"/>
+              </a:rPr>
+              <a:t>sul</a:t>
+            </a:r>
+            <a:r>
+              <a:rPr lang="en-US" sz="2759" dirty="0">
+                <a:solidFill>
+                  <a:srgbClr val="FFFFFF"/>
+                </a:solidFill>
+                <a:latin typeface="Open Sans Light"/>
+              </a:rPr>
+              <a:t> registry </a:t>
+            </a:r>
+            <a:r>
+              <a:rPr lang="en-US" sz="2759" dirty="0" err="1">
+                <a:solidFill>
+                  <a:srgbClr val="FFFFFF"/>
+                </a:solidFill>
+                <a:latin typeface="Open Sans Light"/>
+              </a:rPr>
+              <a:t>alla</a:t>
+            </a:r>
+            <a:r>
+              <a:rPr lang="en-US" sz="2759" dirty="0">
+                <a:solidFill>
+                  <a:srgbClr val="FFFFFF"/>
+                </a:solidFill>
+                <a:latin typeface="Open Sans Light"/>
+              </a:rPr>
+              <a:t> </a:t>
+            </a:r>
+            <a:r>
+              <a:rPr lang="en-US" sz="2759" dirty="0" err="1">
+                <a:solidFill>
+                  <a:srgbClr val="FFFFFF"/>
+                </a:solidFill>
+                <a:latin typeface="Open Sans Light"/>
+              </a:rPr>
+              <a:t>locazione</a:t>
+            </a:r>
+            <a:r>
+              <a:rPr lang="en-US" sz="2759" dirty="0">
+                <a:solidFill>
+                  <a:srgbClr val="FFFFFF"/>
+                </a:solidFill>
+                <a:latin typeface="Open Sans Light"/>
+              </a:rPr>
+              <a:t> </a:t>
+            </a:r>
+            <a:r>
+              <a:rPr lang="en-US" sz="2759" dirty="0" err="1">
+                <a:solidFill>
+                  <a:srgbClr val="FFFFFF"/>
+                </a:solidFill>
+                <a:latin typeface="Open Sans Light"/>
+              </a:rPr>
+              <a:t>corretta</a:t>
+            </a:r>
+            <a:endParaRPr lang="en-US" sz="2759" dirty="0">
+              <a:solidFill>
+                <a:srgbClr val="FFFFFF"/>
+              </a:solidFill>
+              <a:latin typeface="Open Sans Light"/>
+            </a:endParaRPr>
           </a:p>
         </p:txBody>
       </p:sp>
@@ -5679,7 +5871,7 @@
         </p:nvSpPr>
         <p:spPr>
           <a:xfrm>
-            <a:off x="10523637" y="5533009"/>
+            <a:off x="10508586" y="6734989"/>
             <a:ext cx="6432352" cy="463314"/>
           </a:xfrm>
           <a:prstGeom prst="rect">
@@ -5701,13 +5893,76 @@
               </a:spcBef>
             </a:pPr>
             <a:r>
-              <a:rPr lang="en-US" sz="2759">
+              <a:rPr lang="en-US" sz="2759" dirty="0" err="1">
                 <a:solidFill>
                   <a:srgbClr val="FFFFFF"/>
                 </a:solidFill>
                 <a:latin typeface="Open Sans Light"/>
               </a:rPr>
-              <a:t>Attesa di invocazioni da parte del cliente </a:t>
+              <a:t>Attesa</a:t>
+            </a:r>
+            <a:r>
+              <a:rPr lang="en-US" sz="2759" dirty="0">
+                <a:solidFill>
+                  <a:srgbClr val="FFFFFF"/>
+                </a:solidFill>
+                <a:latin typeface="Open Sans Light"/>
+              </a:rPr>
+              <a:t> di </a:t>
+            </a:r>
+            <a:r>
+              <a:rPr lang="en-US" sz="2759" dirty="0" err="1">
+                <a:solidFill>
+                  <a:srgbClr val="FFFFFF"/>
+                </a:solidFill>
+                <a:latin typeface="Open Sans Light"/>
+              </a:rPr>
+              <a:t>invocazioni</a:t>
+            </a:r>
+            <a:r>
+              <a:rPr lang="en-US" sz="2759" dirty="0">
+                <a:solidFill>
+                  <a:srgbClr val="FFFFFF"/>
+                </a:solidFill>
+                <a:latin typeface="Open Sans Light"/>
+              </a:rPr>
+              <a:t> da </a:t>
+            </a:r>
+            <a:r>
+              <a:rPr lang="en-US" sz="2759" dirty="0" err="1">
+                <a:solidFill>
+                  <a:srgbClr val="FFFFFF"/>
+                </a:solidFill>
+                <a:latin typeface="Open Sans Light"/>
+              </a:rPr>
+              <a:t>parte</a:t>
+            </a:r>
+            <a:r>
+              <a:rPr lang="en-US" sz="2759" dirty="0">
+                <a:solidFill>
+                  <a:srgbClr val="FFFFFF"/>
+                </a:solidFill>
+                <a:latin typeface="Open Sans Light"/>
+              </a:rPr>
+              <a:t> del </a:t>
+            </a:r>
+            <a:r>
+              <a:rPr lang="en-US" sz="2759" dirty="0" err="1">
+                <a:solidFill>
+                  <a:srgbClr val="FFFFFF"/>
+                </a:solidFill>
+                <a:latin typeface="Open Sans Light"/>
+              </a:rPr>
+              <a:t>cliente</a:t>
+            </a:r>
+            <a:r>
+              <a:rPr lang="en-US" sz="2759" dirty="0">
+                <a:solidFill>
+                  <a:srgbClr val="FFFFFF"/>
+                </a:solidFill>
+                <a:latin typeface="Open Sans Light"/>
+              </a:rPr>
+              <a:t> </a:t>
             </a:r>
           </a:p>
         </p:txBody>
@@ -5720,7 +5975,7 @@
         </p:nvSpPr>
         <p:spPr>
           <a:xfrm>
-            <a:off x="1950797" y="5533009"/>
+            <a:off x="1955091" y="6792290"/>
             <a:ext cx="6153852" cy="463314"/>
           </a:xfrm>
           <a:prstGeom prst="rect">
@@ -5742,14 +5997,56 @@
               </a:spcBef>
             </a:pPr>
             <a:r>
-              <a:rPr lang="en-US" sz="2759">
+              <a:rPr lang="en-US" sz="2759" dirty="0" err="1">
                 <a:solidFill>
                   <a:srgbClr val="000000"/>
                 </a:solidFill>
                 <a:latin typeface="Open Sans Light"/>
               </a:rPr>
-              <a:t>Lettura dell'input dall'utente</a:t>
-            </a:r>
+              <a:t>Lettura</a:t>
+            </a:r>
+            <a:r>
+              <a:rPr lang="en-US" sz="2759" dirty="0">
+                <a:solidFill>
+                  <a:srgbClr val="000000"/>
+                </a:solidFill>
+                <a:latin typeface="Open Sans Light"/>
+              </a:rPr>
+              <a:t> </a:t>
+            </a:r>
+            <a:r>
+              <a:rPr lang="en-US" sz="2759" dirty="0" err="1">
+                <a:solidFill>
+                  <a:srgbClr val="000000"/>
+                </a:solidFill>
+                <a:latin typeface="Open Sans Light"/>
+              </a:rPr>
+              <a:t>dell'input</a:t>
+            </a:r>
+            <a:r>
+              <a:rPr lang="en-US" sz="2759" dirty="0">
+                <a:solidFill>
+                  <a:srgbClr val="000000"/>
+                </a:solidFill>
+                <a:latin typeface="Open Sans Light"/>
+              </a:rPr>
+              <a:t> </a:t>
+            </a:r>
+            <a:r>
+              <a:rPr lang="en-US" sz="2759" dirty="0" err="1">
+                <a:solidFill>
+                  <a:srgbClr val="000000"/>
+                </a:solidFill>
+                <a:latin typeface="Open Sans Light"/>
+              </a:rPr>
+              <a:t>dall'utente</a:t>
+            </a:r>
+            <a:endParaRPr lang="en-US" sz="2759" dirty="0">
+              <a:solidFill>
+                <a:srgbClr val="000000"/>
+              </a:solidFill>
+              <a:latin typeface="Open Sans Light"/>
+            </a:endParaRPr>
           </a:p>
         </p:txBody>
       </p:sp>
@@ -5761,7 +6058,7 @@
         </p:nvSpPr>
         <p:spPr>
           <a:xfrm>
-            <a:off x="1950797" y="7159338"/>
+            <a:off x="1955091" y="8418619"/>
             <a:ext cx="6153852" cy="1434864"/>
           </a:xfrm>
           <a:prstGeom prst="rect">
@@ -5783,35 +6080,173 @@
               </a:spcBef>
             </a:pPr>
             <a:r>
-              <a:rPr lang="en-US" sz="2759">
+              <a:rPr lang="en-US" sz="2759" dirty="0" err="1">
                 <a:solidFill>
                   <a:srgbClr val="000000"/>
                 </a:solidFill>
                 <a:latin typeface="Open Sans Light"/>
               </a:rPr>
-              <a:t>Invocazione metodo remoto </a:t>
-            </a:r>
-            <a:r>
-              <a:rPr lang="en-US" sz="2759">
+              <a:t>Invocazione</a:t>
+            </a:r>
+            <a:r>
+              <a:rPr lang="en-US" sz="2759" dirty="0">
                 <a:solidFill>
                   <a:srgbClr val="000000"/>
                 </a:solidFill>
+                <a:latin typeface="Open Sans Light"/>
+              </a:rPr>
+              <a:t> </a:t>
+            </a:r>
+            <a:r>
+              <a:rPr lang="en-US" sz="2759" dirty="0" err="1">
+                <a:solidFill>
+                  <a:srgbClr val="000000"/>
+                </a:solidFill>
+                <a:latin typeface="Open Sans Light"/>
+              </a:rPr>
+              <a:t>metodo</a:t>
+            </a:r>
+            <a:r>
+              <a:rPr lang="en-US" sz="2759" dirty="0">
+                <a:solidFill>
+                  <a:srgbClr val="000000"/>
+                </a:solidFill>
+                <a:latin typeface="Open Sans Light"/>
+              </a:rPr>
+              <a:t> </a:t>
+            </a:r>
+            <a:r>
+              <a:rPr lang="en-US" sz="2759" dirty="0" err="1">
+                <a:solidFill>
+                  <a:srgbClr val="000000"/>
+                </a:solidFill>
+                <a:latin typeface="Open Sans Light"/>
+              </a:rPr>
+              <a:t>remoto</a:t>
+            </a:r>
+            <a:r>
+              <a:rPr lang="en-US" sz="2759" dirty="0">
+                <a:solidFill>
+                  <a:srgbClr val="000000"/>
+                </a:solidFill>
+                <a:latin typeface="Open Sans Light"/>
+              </a:rPr>
+              <a:t> </a:t>
+            </a:r>
+            <a:r>
+              <a:rPr lang="en-US" sz="2759" dirty="0" err="1">
+                <a:solidFill>
+                  <a:srgbClr val="000000"/>
+                </a:solidFill>
                 <a:latin typeface="Open Sans Light Bold"/>
               </a:rPr>
               <a:t>conta_righe</a:t>
             </a:r>
             <a:r>
-              <a:rPr lang="en-US" sz="2759">
+              <a:rPr lang="en-US" sz="2759" dirty="0">
                 <a:solidFill>
                   <a:srgbClr val="000000"/>
                 </a:solidFill>
                 <a:latin typeface="Open Sans Light"/>
               </a:rPr>
-              <a:t> e presentazione del risultato</a:t>
-            </a:r>
-          </a:p>
-        </p:txBody>
-      </p:sp>
+              <a:t> e </a:t>
+            </a:r>
+            <a:r>
+              <a:rPr lang="en-US" sz="2759" dirty="0" err="1">
+                <a:solidFill>
+                  <a:srgbClr val="000000"/>
+                </a:solidFill>
+                <a:latin typeface="Open Sans Light"/>
+              </a:rPr>
+              <a:t>presentazione</a:t>
+            </a:r>
+            <a:r>
+              <a:rPr lang="en-US" sz="2759" dirty="0">
+                <a:solidFill>
+                  <a:srgbClr val="000000"/>
+                </a:solidFill>
+                <a:latin typeface="Open Sans Light"/>
+              </a:rPr>
+              <a:t> del </a:t>
+            </a:r>
+            <a:r>
+              <a:rPr lang="en-US" sz="2759" dirty="0" err="1">
+                <a:solidFill>
+                  <a:srgbClr val="000000"/>
+                </a:solidFill>
+                <a:latin typeface="Open Sans Light"/>
+              </a:rPr>
+              <a:t>risultato</a:t>
+            </a:r>
+            <a:endParaRPr lang="en-US" sz="2759" dirty="0">
+              <a:solidFill>
+                <a:srgbClr val="000000"/>
+              </a:solidFill>
+              <a:latin typeface="Open Sans Light"/>
+            </a:endParaRPr>
+          </a:p>
+        </p:txBody>
+      </p:sp>
+      <p:pic>
+        <p:nvPicPr>
+          <p:cNvPr id="42" name="Picture 41">
+            <a:extLst>
+              <a:ext uri="{FF2B5EF4-FFF2-40B4-BE49-F238E27FC236}">
+                <a16:creationId xmlns:a16="http://schemas.microsoft.com/office/drawing/2014/main" id="{638FC788-BC0B-4F85-BF0C-A3422573D731}"/>
+              </a:ext>
+            </a:extLst>
+          </p:cNvPr>
+          <p:cNvPicPr>
+            <a:picLocks noChangeAspect="1"/>
+          </p:cNvPicPr>
+          <p:nvPr/>
+        </p:nvPicPr>
+        <p:blipFill>
+          <a:blip r:embed="rId2"/>
+          <a:stretch>
+            <a:fillRect/>
+          </a:stretch>
+        </p:blipFill>
+        <p:spPr>
+          <a:xfrm>
+            <a:off x="9499956" y="3474164"/>
+            <a:ext cx="7525800" cy="2619741"/>
+          </a:xfrm>
+          <a:prstGeom prst="rect">
+            <a:avLst/>
+          </a:prstGeom>
+        </p:spPr>
+      </p:pic>
+      <p:pic>
+        <p:nvPicPr>
+          <p:cNvPr id="44" name="Picture 43">
+            <a:extLst>
+              <a:ext uri="{FF2B5EF4-FFF2-40B4-BE49-F238E27FC236}">
+                <a16:creationId xmlns:a16="http://schemas.microsoft.com/office/drawing/2014/main" id="{49E53BBE-9FDA-4DFF-917F-E241537A4AFC}"/>
+              </a:ext>
+            </a:extLst>
+          </p:cNvPr>
+          <p:cNvPicPr>
+            <a:picLocks noChangeAspect="1"/>
+          </p:cNvPicPr>
+          <p:nvPr/>
+        </p:nvPicPr>
+        <p:blipFill>
+          <a:blip r:embed="rId3"/>
+          <a:stretch>
+            <a:fillRect/>
+          </a:stretch>
+        </p:blipFill>
+        <p:spPr>
+          <a:xfrm>
+            <a:off x="881601" y="4348649"/>
+            <a:ext cx="7487695" cy="1933845"/>
+          </a:xfrm>
+          <a:prstGeom prst="rect">
+            <a:avLst/>
+          </a:prstGeom>
+        </p:spPr>
+      </p:pic>
     </p:spTree>
   </p:cSld>
   <p:clrMapOvr>
@@ -6069,14 +6504,14 @@
         <p:spPr>
           <a:xfrm>
             <a:off x="383721" y="1884589"/>
-            <a:ext cx="2120057" cy="877570"/>
+            <a:ext cx="2740479" cy="877570"/>
           </a:xfrm>
           <a:prstGeom prst="rect">
             <a:avLst/>
           </a:prstGeom>
         </p:spPr>
         <p:txBody>
-          <a:bodyPr lIns="0" tIns="0" rIns="0" bIns="0" rtlCol="0" anchor="t">
+          <a:bodyPr wrap="square" lIns="0" tIns="0" rIns="0" bIns="0" rtlCol="0" anchor="t">
             <a:spAutoFit/>
           </a:bodyPr>
           <a:lstStyle/>
@@ -6087,7 +6522,7 @@
               </a:lnSpc>
             </a:pPr>
             <a:r>
-              <a:rPr lang="en-US" sz="5199">
+              <a:rPr lang="en-US" sz="5199" dirty="0" err="1">
                 <a:solidFill>
                   <a:srgbClr val="000000"/>
                 </a:solidFill>
@@ -6095,6 +6530,12 @@
               </a:rPr>
               <a:t>Cliente</a:t>
             </a:r>
+            <a:endParaRPr lang="en-US" sz="5199" dirty="0">
+              <a:solidFill>
+                <a:srgbClr val="000000"/>
+              </a:solidFill>
+              <a:latin typeface="Open Sans"/>
+            </a:endParaRPr>
           </a:p>
         </p:txBody>
       </p:sp>
@@ -6106,7 +6547,7 @@
         </p:nvSpPr>
         <p:spPr>
           <a:xfrm>
-            <a:off x="9144000" y="1884589"/>
+            <a:off x="9128236" y="660019"/>
             <a:ext cx="2759273" cy="877570"/>
           </a:xfrm>
           <a:prstGeom prst="rect">
@@ -6125,7 +6566,7 @@
               </a:lnSpc>
             </a:pPr>
             <a:r>
-              <a:rPr lang="en-US" sz="5199">
+              <a:rPr lang="en-US" sz="5199" dirty="0" err="1">
                 <a:solidFill>
                   <a:srgbClr val="FFFFFF"/>
                 </a:solidFill>
@@ -6133,6 +6574,12 @@
               </a:rPr>
               <a:t>Servitore</a:t>
             </a:r>
+            <a:endParaRPr lang="en-US" sz="5199" dirty="0">
+              <a:solidFill>
+                <a:srgbClr val="FFFFFF"/>
+              </a:solidFill>
+              <a:latin typeface="Open Sans"/>
+            </a:endParaRPr>
           </a:p>
         </p:txBody>
       </p:sp>
@@ -6144,7 +6591,7 @@
         </p:nvGrpSpPr>
         <p:grpSpPr>
           <a:xfrm>
-            <a:off x="383721" y="3213424"/>
+            <a:off x="383721" y="2929943"/>
             <a:ext cx="1289957" cy="1289957"/>
             <a:chOff x="0" y="0"/>
             <a:chExt cx="1719943" cy="1719943"/>
@@ -6266,7 +6713,7 @@
         </p:nvGrpSpPr>
         <p:grpSpPr>
           <a:xfrm>
-            <a:off x="383721" y="5143500"/>
+            <a:off x="383721" y="6360996"/>
             <a:ext cx="1289957" cy="1289957"/>
             <a:chOff x="0" y="0"/>
             <a:chExt cx="1719943" cy="1719943"/>
@@ -6368,7 +6815,7 @@
                 </a:lnSpc>
               </a:pPr>
               <a:r>
-                <a:rPr lang="en-US" sz="3399">
+                <a:rPr lang="en-US" sz="3399" dirty="0">
                   <a:solidFill>
                     <a:srgbClr val="FFFFFF"/>
                   </a:solidFill>
@@ -6388,7 +6835,7 @@
         </p:nvGrpSpPr>
         <p:grpSpPr>
           <a:xfrm>
-            <a:off x="383721" y="7255604"/>
+            <a:off x="383721" y="8473100"/>
             <a:ext cx="1289957" cy="1289957"/>
             <a:chOff x="0" y="0"/>
             <a:chExt cx="1719943" cy="1719943"/>
@@ -6510,7 +6957,7 @@
         </p:nvGrpSpPr>
         <p:grpSpPr>
           <a:xfrm>
-            <a:off x="8992365" y="3213424"/>
+            <a:off x="9007983" y="1737967"/>
             <a:ext cx="1289957" cy="1289957"/>
             <a:chOff x="0" y="0"/>
             <a:chExt cx="1719943" cy="1719943"/>
@@ -6612,7 +7059,7 @@
                 </a:lnSpc>
               </a:pPr>
               <a:r>
-                <a:rPr lang="en-US" sz="3399">
+                <a:rPr lang="en-US" sz="3399" dirty="0">
                   <a:solidFill>
                     <a:srgbClr val="FFFFFF"/>
                   </a:solidFill>
@@ -6632,7 +7079,7 @@
         </p:nvGrpSpPr>
         <p:grpSpPr>
           <a:xfrm>
-            <a:off x="8992365" y="5143500"/>
+            <a:off x="8976601" y="6177693"/>
             <a:ext cx="1289957" cy="1289957"/>
             <a:chOff x="0" y="0"/>
             <a:chExt cx="1719943" cy="1719943"/>
@@ -6754,7 +7201,7 @@
         </p:nvGrpSpPr>
         <p:grpSpPr>
           <a:xfrm>
-            <a:off x="8992365" y="7255604"/>
+            <a:off x="8976601" y="8289797"/>
             <a:ext cx="1289957" cy="1289957"/>
             <a:chOff x="0" y="0"/>
             <a:chExt cx="1719943" cy="1719943"/>
@@ -6876,7 +7323,7 @@
         </p:nvSpPr>
         <p:spPr>
           <a:xfrm>
-            <a:off x="1828332" y="3311405"/>
+            <a:off x="1828332" y="3027924"/>
             <a:ext cx="6153852" cy="949089"/>
           </a:xfrm>
           <a:prstGeom prst="rect">
@@ -6917,7 +7364,7 @@
         </p:nvSpPr>
         <p:spPr>
           <a:xfrm>
-            <a:off x="1828332" y="5484368"/>
+            <a:off x="1828332" y="6701864"/>
             <a:ext cx="6153852" cy="463314"/>
           </a:xfrm>
           <a:prstGeom prst="rect">
@@ -6939,14 +7386,56 @@
               </a:spcBef>
             </a:pPr>
             <a:r>
-              <a:rPr lang="en-US" sz="2759">
+              <a:rPr lang="en-US" sz="2759" dirty="0" err="1">
                 <a:solidFill>
                   <a:srgbClr val="000000"/>
                 </a:solidFill>
                 <a:latin typeface="Open Sans Light"/>
               </a:rPr>
-              <a:t>Lettura dell'input dall'utente</a:t>
-            </a:r>
+              <a:t>Lettura</a:t>
+            </a:r>
+            <a:r>
+              <a:rPr lang="en-US" sz="2759" dirty="0">
+                <a:solidFill>
+                  <a:srgbClr val="000000"/>
+                </a:solidFill>
+                <a:latin typeface="Open Sans Light"/>
+              </a:rPr>
+              <a:t> </a:t>
+            </a:r>
+            <a:r>
+              <a:rPr lang="en-US" sz="2759" dirty="0" err="1">
+                <a:solidFill>
+                  <a:srgbClr val="000000"/>
+                </a:solidFill>
+                <a:latin typeface="Open Sans Light"/>
+              </a:rPr>
+              <a:t>dell'input</a:t>
+            </a:r>
+            <a:r>
+              <a:rPr lang="en-US" sz="2759" dirty="0">
+                <a:solidFill>
+                  <a:srgbClr val="000000"/>
+                </a:solidFill>
+                <a:latin typeface="Open Sans Light"/>
+              </a:rPr>
+              <a:t> </a:t>
+            </a:r>
+            <a:r>
+              <a:rPr lang="en-US" sz="2759" dirty="0" err="1">
+                <a:solidFill>
+                  <a:srgbClr val="000000"/>
+                </a:solidFill>
+                <a:latin typeface="Open Sans Light"/>
+              </a:rPr>
+              <a:t>dall'utente</a:t>
+            </a:r>
+            <a:endParaRPr lang="en-US" sz="2759" dirty="0">
+              <a:solidFill>
+                <a:srgbClr val="000000"/>
+              </a:solidFill>
+              <a:latin typeface="Open Sans Light"/>
+            </a:endParaRPr>
           </a:p>
         </p:txBody>
       </p:sp>
@@ -6958,7 +7447,7 @@
         </p:nvSpPr>
         <p:spPr>
           <a:xfrm>
-            <a:off x="1828332" y="7110697"/>
+            <a:off x="1828332" y="8328193"/>
             <a:ext cx="6153852" cy="1434864"/>
           </a:xfrm>
           <a:prstGeom prst="rect">
@@ -7017,7 +7506,7 @@
         </p:nvSpPr>
         <p:spPr>
           <a:xfrm>
-            <a:off x="10523637" y="7402225"/>
+            <a:off x="10507873" y="8436418"/>
             <a:ext cx="6387405" cy="949089"/>
           </a:xfrm>
           <a:prstGeom prst="rect">
@@ -7071,7 +7560,7 @@
         </p:nvSpPr>
         <p:spPr>
           <a:xfrm>
-            <a:off x="10492255" y="3360046"/>
+            <a:off x="10507873" y="1884589"/>
             <a:ext cx="7446466" cy="949089"/>
           </a:xfrm>
           <a:prstGeom prst="rect">
@@ -7093,14 +7582,128 @@
               </a:spcBef>
             </a:pPr>
             <a:r>
-              <a:rPr lang="en-US" sz="2759">
+              <a:rPr lang="en-US" sz="2759" dirty="0" err="1">
                 <a:solidFill>
                   <a:srgbClr val="FFFFFF"/>
                 </a:solidFill>
                 <a:latin typeface="Open Sans Light"/>
               </a:rPr>
-              <a:t>Registrare il riferimento remoto sul registry alla locazione corretta</a:t>
-            </a:r>
+              <a:t>Registrare</a:t>
+            </a:r>
+            <a:r>
+              <a:rPr lang="en-US" sz="2759" dirty="0">
+                <a:solidFill>
+                  <a:srgbClr val="FFFFFF"/>
+                </a:solidFill>
+                <a:latin typeface="Open Sans Light"/>
+              </a:rPr>
+              <a:t> il </a:t>
+            </a:r>
+            <a:r>
+              <a:rPr lang="en-US" sz="2759" dirty="0" err="1">
+                <a:solidFill>
+                  <a:srgbClr val="FFFFFF"/>
+                </a:solidFill>
+                <a:latin typeface="Open Sans Light"/>
+              </a:rPr>
+              <a:t>riferimento</a:t>
+            </a:r>
+            <a:r>
+              <a:rPr lang="en-US" sz="2759" dirty="0">
+                <a:solidFill>
+                  <a:srgbClr val="FFFFFF"/>
+                </a:solidFill>
+                <a:latin typeface="Open Sans Light"/>
+              </a:rPr>
+              <a:t> </a:t>
+            </a:r>
+            <a:r>
+              <a:rPr lang="en-US" sz="2759" dirty="0" err="1">
+                <a:solidFill>
+                  <a:srgbClr val="FFFFFF"/>
+                </a:solidFill>
+                <a:latin typeface="Open Sans Light"/>
+              </a:rPr>
+              <a:t>remoto</a:t>
+            </a:r>
+            <a:r>
+              <a:rPr lang="en-US" sz="2759" dirty="0">
+                <a:solidFill>
+                  <a:srgbClr val="FFFFFF"/>
+                </a:solidFill>
+                <a:latin typeface="Open Sans Light"/>
+              </a:rPr>
+              <a:t> </a:t>
+            </a:r>
+            <a:r>
+              <a:rPr lang="en-US" sz="2759" dirty="0" err="1">
+                <a:solidFill>
+                  <a:srgbClr val="FFFFFF"/>
+                </a:solidFill>
+                <a:latin typeface="Open Sans Light"/>
+              </a:rPr>
+              <a:t>sul</a:t>
+            </a:r>
+            <a:r>
+              <a:rPr lang="en-US" sz="2759" dirty="0">
+                <a:solidFill>
+                  <a:srgbClr val="FFFFFF"/>
+                </a:solidFill>
+                <a:latin typeface="Open Sans Light"/>
+              </a:rPr>
+              <a:t> registry </a:t>
+            </a:r>
+            <a:r>
+              <a:rPr lang="en-US" sz="2759" dirty="0" err="1">
+                <a:solidFill>
+                  <a:srgbClr val="FFFFFF"/>
+                </a:solidFill>
+                <a:latin typeface="Open Sans Light"/>
+              </a:rPr>
+              <a:t>alla</a:t>
+            </a:r>
+            <a:r>
+              <a:rPr lang="en-US" sz="2759" dirty="0">
+                <a:solidFill>
+                  <a:srgbClr val="FFFFFF"/>
+                </a:solidFill>
+                <a:latin typeface="Open Sans Light"/>
+              </a:rPr>
+              <a:t> </a:t>
+            </a:r>
+            <a:r>
+              <a:rPr lang="en-US" sz="2759" dirty="0" err="1">
+                <a:solidFill>
+                  <a:srgbClr val="FFFFFF"/>
+                </a:solidFill>
+                <a:latin typeface="Open Sans Light"/>
+              </a:rPr>
+              <a:t>locazione</a:t>
+            </a:r>
+            <a:r>
+              <a:rPr lang="en-US" sz="2759" dirty="0">
+                <a:solidFill>
+                  <a:srgbClr val="FFFFFF"/>
+                </a:solidFill>
+                <a:latin typeface="Open Sans Light"/>
+              </a:rPr>
+              <a:t> </a:t>
+            </a:r>
+            <a:r>
+              <a:rPr lang="en-US" sz="2759" dirty="0" err="1">
+                <a:solidFill>
+                  <a:srgbClr val="FFFFFF"/>
+                </a:solidFill>
+                <a:latin typeface="Open Sans Light"/>
+              </a:rPr>
+              <a:t>corretta</a:t>
+            </a:r>
+            <a:endParaRPr lang="en-US" sz="2759" dirty="0">
+              <a:solidFill>
+                <a:srgbClr val="FFFFFF"/>
+              </a:solidFill>
+              <a:latin typeface="Open Sans Light"/>
+            </a:endParaRPr>
           </a:p>
         </p:txBody>
       </p:sp>
@@ -7112,7 +7715,7 @@
         </p:nvSpPr>
         <p:spPr>
           <a:xfrm>
-            <a:off x="10523637" y="5533009"/>
+            <a:off x="10507873" y="6567202"/>
             <a:ext cx="6432352" cy="463314"/>
           </a:xfrm>
           <a:prstGeom prst="rect">
@@ -7145,6 +7748,66 @@
           </a:p>
         </p:txBody>
       </p:sp>
+      <p:pic>
+        <p:nvPicPr>
+          <p:cNvPr id="44" name="Picture 43">
+            <a:extLst>
+              <a:ext uri="{FF2B5EF4-FFF2-40B4-BE49-F238E27FC236}">
+                <a16:creationId xmlns:a16="http://schemas.microsoft.com/office/drawing/2014/main" id="{B9FEB9AC-3341-4B3A-9FA7-E8488B60467A}"/>
+              </a:ext>
+            </a:extLst>
+          </p:cNvPr>
+          <p:cNvPicPr>
+            <a:picLocks noChangeAspect="1"/>
+          </p:cNvPicPr>
+          <p:nvPr/>
+        </p:nvPicPr>
+        <p:blipFill>
+          <a:blip r:embed="rId2"/>
+          <a:stretch>
+            <a:fillRect/>
+          </a:stretch>
+        </p:blipFill>
+        <p:spPr>
+          <a:xfrm>
+            <a:off x="9499243" y="3330140"/>
+            <a:ext cx="7525800" cy="2619741"/>
+          </a:xfrm>
+          <a:prstGeom prst="rect">
+            <a:avLst/>
+          </a:prstGeom>
+        </p:spPr>
+      </p:pic>
+      <p:pic>
+        <p:nvPicPr>
+          <p:cNvPr id="46" name="Picture 45">
+            <a:extLst>
+              <a:ext uri="{FF2B5EF4-FFF2-40B4-BE49-F238E27FC236}">
+                <a16:creationId xmlns:a16="http://schemas.microsoft.com/office/drawing/2014/main" id="{D071A827-9D14-4490-AD84-F40CAF523C67}"/>
+              </a:ext>
+            </a:extLst>
+          </p:cNvPr>
+          <p:cNvPicPr>
+            <a:picLocks noChangeAspect="1"/>
+          </p:cNvPicPr>
+          <p:nvPr/>
+        </p:nvPicPr>
+        <p:blipFill>
+          <a:blip r:embed="rId3"/>
+          <a:stretch>
+            <a:fillRect/>
+          </a:stretch>
+        </p:blipFill>
+        <p:spPr>
+          <a:xfrm>
+            <a:off x="906363" y="4323525"/>
+            <a:ext cx="7487695" cy="1933845"/>
+          </a:xfrm>
+          <a:prstGeom prst="rect">
+            <a:avLst/>
+          </a:prstGeom>
+        </p:spPr>
+      </p:pic>
     </p:spTree>
   </p:cSld>
   <p:clrMapOvr>
@@ -7363,7 +8026,7 @@
         </p:nvSpPr>
         <p:spPr>
           <a:xfrm>
-            <a:off x="350490" y="588737"/>
+            <a:off x="350490" y="181872"/>
             <a:ext cx="7924949" cy="688974"/>
           </a:xfrm>
           <a:prstGeom prst="rect">
@@ -7382,13 +8045,40 @@
               </a:lnSpc>
             </a:pPr>
             <a:r>
-              <a:rPr lang="en-US" sz="4000">
+              <a:rPr lang="en-US" sz="4000" dirty="0" err="1">
                 <a:solidFill>
                   <a:srgbClr val="000000"/>
                 </a:solidFill>
                 <a:latin typeface="Open Sans Extra Bold"/>
               </a:rPr>
-              <a:t>Implementazione conta_righe </a:t>
+              <a:t>Implementazione</a:t>
+            </a:r>
+            <a:r>
+              <a:rPr lang="en-US" sz="4000" dirty="0">
+                <a:solidFill>
+                  <a:srgbClr val="000000"/>
+                </a:solidFill>
+                <a:latin typeface="Open Sans Extra Bold"/>
+              </a:rPr>
+              <a:t> </a:t>
+            </a:r>
+            <a:r>
+              <a:rPr lang="en-US" sz="4000" dirty="0" err="1">
+                <a:solidFill>
+                  <a:srgbClr val="000000"/>
+                </a:solidFill>
+                <a:latin typeface="Open Sans Extra Bold"/>
+              </a:rPr>
+              <a:t>conta_righe</a:t>
+            </a:r>
+            <a:r>
+              <a:rPr lang="en-US" sz="4000" dirty="0">
+                <a:solidFill>
+                  <a:srgbClr val="000000"/>
+                </a:solidFill>
+                <a:latin typeface="Open Sans Extra Bold"/>
+              </a:rPr>
+              <a:t> </a:t>
             </a:r>
           </a:p>
         </p:txBody>
@@ -7401,7 +8091,7 @@
         </p:nvSpPr>
         <p:spPr>
           <a:xfrm>
-            <a:off x="475538" y="1884589"/>
+            <a:off x="475538" y="3397118"/>
             <a:ext cx="5470497" cy="877570"/>
           </a:xfrm>
           <a:prstGeom prst="rect">
@@ -7445,7 +8135,7 @@
         </p:nvSpPr>
         <p:spPr>
           <a:xfrm>
-            <a:off x="9083359" y="0"/>
+            <a:off x="9170003" y="1316621"/>
             <a:ext cx="6951218" cy="877570"/>
           </a:xfrm>
           <a:prstGeom prst="rect">
@@ -7503,7 +8193,7 @@
         </p:blipFill>
         <p:spPr>
           <a:xfrm>
-            <a:off x="381866" y="3220088"/>
+            <a:off x="381866" y="4732617"/>
             <a:ext cx="7992590" cy="5182323"/>
           </a:xfrm>
           <a:prstGeom prst="rect">
@@ -7533,7 +8223,7 @@
         </p:blipFill>
         <p:spPr>
           <a:xfrm>
-            <a:off x="9157148" y="3390900"/>
+            <a:off x="9152074" y="2644548"/>
             <a:ext cx="7411484" cy="6716062"/>
           </a:xfrm>
           <a:prstGeom prst="rect">
@@ -7541,84 +8231,6 @@
           </a:prstGeom>
         </p:spPr>
       </p:pic>
-      <p:sp>
-        <p:nvSpPr>
-          <p:cNvPr id="19" name="TextBox 18">
-            <a:extLst>
-              <a:ext uri="{FF2B5EF4-FFF2-40B4-BE49-F238E27FC236}">
-                <a16:creationId xmlns:a16="http://schemas.microsoft.com/office/drawing/2014/main" id="{89D6BF0B-954F-4609-9991-D79722D28A8E}"/>
-              </a:ext>
-            </a:extLst>
-          </p:cNvPr>
-          <p:cNvSpPr txBox="1"/>
-          <p:nvPr/>
-        </p:nvSpPr>
-        <p:spPr>
-          <a:xfrm>
-            <a:off x="8685579" y="1238258"/>
-            <a:ext cx="393056" cy="584775"/>
-          </a:xfrm>
-          <a:prstGeom prst="rect">
-            <a:avLst/>
-          </a:prstGeom>
-          <a:noFill/>
-        </p:spPr>
-        <p:txBody>
-          <a:bodyPr wrap="none" rtlCol="0">
-            <a:spAutoFit/>
-          </a:bodyPr>
-          <a:lstStyle/>
-          <a:p>
-            <a:r>
-              <a:rPr lang="it-IT" sz="3200" dirty="0">
-                <a:solidFill>
-                  <a:schemeClr val="bg1"/>
-                </a:solidFill>
-              </a:rPr>
-              <a:t>1</a:t>
-            </a:r>
-          </a:p>
-        </p:txBody>
-      </p:sp>
-      <p:sp>
-        <p:nvSpPr>
-          <p:cNvPr id="20" name="TextBox 19">
-            <a:extLst>
-              <a:ext uri="{FF2B5EF4-FFF2-40B4-BE49-F238E27FC236}">
-                <a16:creationId xmlns:a16="http://schemas.microsoft.com/office/drawing/2014/main" id="{837E5857-7F13-4353-83B0-A83C6A51A119}"/>
-              </a:ext>
-            </a:extLst>
-          </p:cNvPr>
-          <p:cNvSpPr txBox="1"/>
-          <p:nvPr/>
-        </p:nvSpPr>
-        <p:spPr>
-          <a:xfrm>
-            <a:off x="8712149" y="3122847"/>
-            <a:ext cx="393056" cy="584775"/>
-          </a:xfrm>
-          <a:prstGeom prst="rect">
-            <a:avLst/>
-          </a:prstGeom>
-          <a:noFill/>
-        </p:spPr>
-        <p:txBody>
-          <a:bodyPr wrap="none" rtlCol="0">
-            <a:spAutoFit/>
-          </a:bodyPr>
-          <a:lstStyle/>
-          <a:p>
-            <a:r>
-              <a:rPr lang="it-IT" sz="3200" dirty="0">
-                <a:solidFill>
-                  <a:schemeClr val="bg1"/>
-                </a:solidFill>
-              </a:rPr>
-              <a:t>2</a:t>
-            </a:r>
-          </a:p>
-        </p:txBody>
-      </p:sp>
       <p:pic>
         <p:nvPicPr>
           <p:cNvPr id="22" name="Picture 21">
@@ -7641,7 +8253,7 @@
         </p:blipFill>
         <p:spPr>
           <a:xfrm>
-            <a:off x="9144000" y="1304786"/>
+            <a:off x="475538" y="1336455"/>
             <a:ext cx="7059010" cy="1390844"/>
           </a:xfrm>
           <a:prstGeom prst="rect">
@@ -7745,7 +8357,7 @@
         </p:nvSpPr>
         <p:spPr>
           <a:xfrm>
-            <a:off x="222349" y="650875"/>
+            <a:off x="217867" y="343650"/>
             <a:ext cx="8248650" cy="662939"/>
           </a:xfrm>
           <a:prstGeom prst="rect">
@@ -7764,13 +8376,40 @@
               </a:lnSpc>
             </a:pPr>
             <a:r>
-              <a:rPr lang="en-US" sz="3900">
+              <a:rPr lang="en-US" sz="3900" dirty="0" err="1">
                 <a:solidFill>
                   <a:srgbClr val="000000"/>
                 </a:solidFill>
                 <a:latin typeface="Open Sans Extra Bold"/>
               </a:rPr>
-              <a:t>Implementazione elimina_righe </a:t>
+              <a:t>Implementazione</a:t>
+            </a:r>
+            <a:r>
+              <a:rPr lang="en-US" sz="3900" dirty="0">
+                <a:solidFill>
+                  <a:srgbClr val="000000"/>
+                </a:solidFill>
+                <a:latin typeface="Open Sans Extra Bold"/>
+              </a:rPr>
+              <a:t> </a:t>
+            </a:r>
+            <a:r>
+              <a:rPr lang="en-US" sz="3900" dirty="0" err="1">
+                <a:solidFill>
+                  <a:srgbClr val="000000"/>
+                </a:solidFill>
+                <a:latin typeface="Open Sans Extra Bold"/>
+              </a:rPr>
+              <a:t>elimina_righe</a:t>
+            </a:r>
+            <a:r>
+              <a:rPr lang="en-US" sz="3900" dirty="0">
+                <a:solidFill>
+                  <a:srgbClr val="000000"/>
+                </a:solidFill>
+                <a:latin typeface="Open Sans Extra Bold"/>
+              </a:rPr>
+              <a:t> </a:t>
             </a:r>
           </a:p>
         </p:txBody>
@@ -7783,7 +8422,7 @@
         </p:nvSpPr>
         <p:spPr>
           <a:xfrm>
-            <a:off x="455127" y="1884589"/>
+            <a:off x="450645" y="3162300"/>
             <a:ext cx="5470497" cy="877570"/>
           </a:xfrm>
           <a:prstGeom prst="rect">
@@ -7821,7 +8460,7 @@
         </p:nvSpPr>
         <p:spPr>
           <a:xfrm>
-            <a:off x="8940627" y="-95135"/>
+            <a:off x="9144000" y="1353677"/>
             <a:ext cx="6951218" cy="877570"/>
           </a:xfrm>
           <a:prstGeom prst="rect">
@@ -7854,84 +8493,6 @@
               </a:solidFill>
               <a:latin typeface="Open Sans"/>
             </a:endParaRPr>
-          </a:p>
-        </p:txBody>
-      </p:sp>
-      <p:sp>
-        <p:nvSpPr>
-          <p:cNvPr id="11" name="TextBox 10">
-            <a:extLst>
-              <a:ext uri="{FF2B5EF4-FFF2-40B4-BE49-F238E27FC236}">
-                <a16:creationId xmlns:a16="http://schemas.microsoft.com/office/drawing/2014/main" id="{CB481C6B-CB88-414A-B62F-539E8530A4AF}"/>
-              </a:ext>
-            </a:extLst>
-          </p:cNvPr>
-          <p:cNvSpPr txBox="1"/>
-          <p:nvPr/>
-        </p:nvSpPr>
-        <p:spPr>
-          <a:xfrm>
-            <a:off x="8634132" y="893756"/>
-            <a:ext cx="393056" cy="584775"/>
-          </a:xfrm>
-          <a:prstGeom prst="rect">
-            <a:avLst/>
-          </a:prstGeom>
-          <a:noFill/>
-        </p:spPr>
-        <p:txBody>
-          <a:bodyPr wrap="none" rtlCol="0">
-            <a:spAutoFit/>
-          </a:bodyPr>
-          <a:lstStyle/>
-          <a:p>
-            <a:r>
-              <a:rPr lang="it-IT" sz="3200" dirty="0">
-                <a:solidFill>
-                  <a:schemeClr val="bg1"/>
-                </a:solidFill>
-              </a:rPr>
-              <a:t>1</a:t>
-            </a:r>
-          </a:p>
-        </p:txBody>
-      </p:sp>
-      <p:sp>
-        <p:nvSpPr>
-          <p:cNvPr id="12" name="TextBox 11">
-            <a:extLst>
-              <a:ext uri="{FF2B5EF4-FFF2-40B4-BE49-F238E27FC236}">
-                <a16:creationId xmlns:a16="http://schemas.microsoft.com/office/drawing/2014/main" id="{99955DFA-B384-44DE-A4C5-5915FA847F05}"/>
-              </a:ext>
-            </a:extLst>
-          </p:cNvPr>
-          <p:cNvSpPr txBox="1"/>
-          <p:nvPr/>
-        </p:nvSpPr>
-        <p:spPr>
-          <a:xfrm>
-            <a:off x="8616203" y="2327605"/>
-            <a:ext cx="393056" cy="584775"/>
-          </a:xfrm>
-          <a:prstGeom prst="rect">
-            <a:avLst/>
-          </a:prstGeom>
-          <a:noFill/>
-        </p:spPr>
-        <p:txBody>
-          <a:bodyPr wrap="none" rtlCol="0">
-            <a:spAutoFit/>
-          </a:bodyPr>
-          <a:lstStyle/>
-          <a:p>
-            <a:r>
-              <a:rPr lang="it-IT" sz="3200" dirty="0">
-                <a:solidFill>
-                  <a:schemeClr val="bg1"/>
-                </a:solidFill>
-              </a:rPr>
-              <a:t>2</a:t>
-            </a:r>
           </a:p>
         </p:txBody>
       </p:sp>
@@ -7957,7 +8518,7 @@
         </p:blipFill>
         <p:spPr>
           <a:xfrm>
-            <a:off x="9091979" y="945238"/>
+            <a:off x="217867" y="1550115"/>
             <a:ext cx="7211431" cy="1362265"/>
           </a:xfrm>
           <a:prstGeom prst="rect">
@@ -8121,7 +8682,7 @@
         </p:blipFill>
         <p:spPr>
           <a:xfrm>
-            <a:off x="222349" y="3009900"/>
+            <a:off x="217867" y="4287611"/>
             <a:ext cx="7697274" cy="5553850"/>
           </a:xfrm>
           <a:prstGeom prst="rect">

</xml_diff>